<commit_message>
changed architecture to show end to end implementation
</commit_message>
<xml_diff>
--- a/doc/architecture.pptx
+++ b/doc/architecture.pptx
@@ -6800,7 +6800,7 @@
         </p:nvSpPr>
         <p:spPr>
           <a:xfrm>
-            <a:off x="14384042" y="2760138"/>
+            <a:off x="15102692" y="3353538"/>
             <a:ext cx="1220700" cy="308100"/>
           </a:xfrm>
           <a:prstGeom prst="rect">
@@ -7343,58 +7343,6 @@
       <p:sp>
         <p:nvSpPr>
           <p:cNvPr id="100" name="Google Shape;100;p13"/>
-          <p:cNvSpPr/>
-          <p:nvPr/>
-        </p:nvSpPr>
-        <p:spPr>
-          <a:xfrm>
-            <a:off x="14048851" y="1809175"/>
-            <a:ext cx="3958800" cy="3450000"/>
-          </a:xfrm>
-          <a:prstGeom prst="rect">
-            <a:avLst/>
-          </a:prstGeom>
-          <a:noFill/>
-          <a:ln cap="flat" cmpd="sng" w="12700">
-            <a:solidFill>
-              <a:srgbClr val="5A6B86"/>
-            </a:solidFill>
-            <a:prstDash val="dash"/>
-            <a:miter lim="800000"/>
-            <a:headEnd len="sm" w="sm" type="none"/>
-            <a:tailEnd len="sm" w="sm" type="none"/>
-          </a:ln>
-        </p:spPr>
-        <p:txBody>
-          <a:bodyPr anchorCtr="0" anchor="t" bIns="45700" lIns="91425" spcFirstLastPara="1" rIns="91425" wrap="square" tIns="91425">
-            <a:noAutofit/>
-          </a:bodyPr>
-          <a:lstStyle/>
-          <a:p>
-            <a:pPr indent="0" lvl="0" marL="0" marR="0" rtl="0" algn="ctr">
-              <a:spcBef>
-                <a:spcPts val="0"/>
-              </a:spcBef>
-              <a:spcAft>
-                <a:spcPts val="0"/>
-              </a:spcAft>
-              <a:buNone/>
-            </a:pPr>
-            <a:r>
-              <a:rPr lang="en" sz="1200">
-                <a:solidFill>
-                  <a:srgbClr val="5A6B86"/>
-                </a:solidFill>
-              </a:rPr>
-              <a:t>Under construction</a:t>
-            </a:r>
-            <a:endParaRPr/>
-          </a:p>
-        </p:txBody>
-      </p:sp>
-      <p:sp>
-        <p:nvSpPr>
-          <p:cNvPr id="101" name="Google Shape;101;p13"/>
           <p:cNvSpPr txBox="1"/>
           <p:nvPr/>
         </p:nvSpPr>

</xml_diff>